<commit_message>
EDIT: Made some editingdde
</commit_message>
<xml_diff>
--- a/Assignment7/Assignment 7 - NTAP.pptx
+++ b/Assignment7/Assignment 7 - NTAP.pptx
@@ -2767,15 +2767,7 @@
             </a:r>
             <a:r>
               <a:rPr lang="en-US" baseline="0" dirty="0" smtClean="0"/>
-              <a:t> Random Forest was implemented and tested, next step was to Serialize the trained model. Random Forest generation is a time taking process especially when the number of trees is large and training data is huge. It is helpful because we </a:t>
-            </a:r>
-            <a:r>
-              <a:rPr lang="en-US" baseline="0" dirty="0" smtClean="0"/>
-              <a:t>do not need to generate decision trees over and over and we </a:t>
-            </a:r>
-            <a:r>
-              <a:rPr lang="en-US" baseline="0" dirty="0" smtClean="0"/>
-              <a:t>can simply test any number of instances against this trained model. </a:t>
+              <a:t> Random Forest was implemented and tested, next step was to Serialize the trained model. Random Forest generation is a time taking process especially when the number of trees is large and training data is huge. It is helpful because we do not need to generate decision trees over and over and we can simply test any number of instances against this trained model. </a:t>
             </a:r>
             <a:endParaRPr lang="en-US" dirty="0"/>
           </a:p>
@@ -5899,7 +5891,7 @@
                   </a:schemeClr>
                 </a:solidFill>
               </a:rPr>
-              <a:t>(</a:t>
+              <a:t>(Andrew - </a:t>
             </a:r>
             <a:r>
               <a:rPr lang="en-US" sz="2400" dirty="0" err="1" smtClean="0">
@@ -7290,7 +7282,6 @@
               <a:rPr lang="en-US" dirty="0" smtClean="0"/>
               <a:t>3654 instances</a:t>
             </a:r>
-            <a:endParaRPr lang="en-US" dirty="0" smtClean="0"/>
           </a:p>
         </p:txBody>
       </p:sp>
@@ -8481,11 +8472,7 @@
           <a:p>
             <a:r>
               <a:rPr lang="en-US" dirty="0" smtClean="0"/>
-              <a:t>Error </a:t>
-            </a:r>
-            <a:r>
-              <a:rPr lang="en-US" dirty="0" smtClean="0"/>
-              <a:t>Analysis &amp; Challenges</a:t>
+              <a:t>Error Analysis &amp; Challenges</a:t>
             </a:r>
             <a:endParaRPr lang="en-US" dirty="0"/>
           </a:p>
@@ -8595,7 +8582,6 @@
               <a:rPr lang="en-US" dirty="0"/>
               <a:t>Error Analysis &amp; Challenges</a:t>
             </a:r>
-            <a:endParaRPr lang="en-US" dirty="0"/>
           </a:p>
         </p:txBody>
       </p:sp>
@@ -8663,7 +8649,6 @@
               <a:rPr lang="en-US" dirty="0" smtClean="0"/>
               <a:t>relevant</a:t>
             </a:r>
-            <a:endParaRPr lang="en-US" dirty="0" smtClean="0"/>
           </a:p>
           <a:p>
             <a:r>
@@ -8684,7 +8669,6 @@
               <a:rPr lang="en-US" dirty="0" smtClean="0"/>
               <a:t>For larger datasets, results degraded</a:t>
             </a:r>
-            <a:endParaRPr lang="en-US" dirty="0" smtClean="0"/>
           </a:p>
           <a:p>
             <a:pPr lvl="1"/>
@@ -8747,7 +8731,6 @@
               <a:rPr lang="en-US" dirty="0"/>
               <a:t>Error Analysis &amp; Challenges</a:t>
             </a:r>
-            <a:endParaRPr lang="en-US" dirty="0"/>
           </a:p>
         </p:txBody>
       </p:sp>
@@ -8792,7 +8775,6 @@
               <a:rPr lang="en-US" dirty="0" smtClean="0"/>
               <a:t>How to minimize that noise?</a:t>
             </a:r>
-            <a:endParaRPr lang="en-US" dirty="0" smtClean="0"/>
           </a:p>
           <a:p>
             <a:r>
@@ -8806,7 +8788,6 @@
               <a:rPr lang="en-US" dirty="0" smtClean="0"/>
               <a:t>Takes hours to know that the feature is improving performance or not</a:t>
             </a:r>
-            <a:endParaRPr lang="en-US" dirty="0" smtClean="0"/>
           </a:p>
           <a:p>
             <a:pPr lvl="1"/>
@@ -8888,11 +8869,7 @@
           <a:p>
             <a:r>
               <a:rPr lang="en-US" dirty="0" smtClean="0"/>
-              <a:t>Problem </a:t>
-            </a:r>
-            <a:r>
-              <a:rPr lang="en-US" dirty="0" smtClean="0"/>
-              <a:t>statement</a:t>
+              <a:t>Problem statement</a:t>
             </a:r>
           </a:p>
           <a:p>
@@ -8974,7 +8951,6 @@
               <a:rPr lang="en-US" dirty="0"/>
               <a:t>Error Analysis &amp; Challenges</a:t>
             </a:r>
-            <a:endParaRPr lang="en-US" dirty="0"/>
           </a:p>
         </p:txBody>
       </p:sp>
@@ -9031,7 +9007,6 @@
               <a:rPr lang="en-US" dirty="0" smtClean="0"/>
               <a:t>different classifiers and apply tweaks to them</a:t>
             </a:r>
-            <a:endParaRPr lang="en-US" dirty="0" smtClean="0"/>
           </a:p>
           <a:p>
             <a:pPr lvl="1"/>
@@ -9228,7 +9203,6 @@
               <a:rPr lang="en-US" dirty="0" smtClean="0"/>
               <a:t>Identify more features</a:t>
             </a:r>
-            <a:endParaRPr lang="en-US" dirty="0" smtClean="0"/>
           </a:p>
           <a:p>
             <a:r>
@@ -9241,7 +9215,6 @@
               <a:rPr lang="en-US" dirty="0" smtClean="0"/>
               <a:t>Learn how features from different currency pair could help</a:t>
             </a:r>
-            <a:endParaRPr lang="en-US" dirty="0" smtClean="0"/>
           </a:p>
           <a:p>
             <a:r>
@@ -9564,7 +9537,6 @@
               <a:rPr lang="en-US" dirty="0"/>
               <a:t>1- Feature Extraction</a:t>
             </a:r>
-            <a:endParaRPr lang="en-US" dirty="0"/>
           </a:p>
         </p:txBody>
       </p:sp>
@@ -9807,7 +9779,6 @@
               <a:rPr lang="en-US" dirty="0"/>
               <a:t>1- Feature Extraction</a:t>
             </a:r>
-            <a:endParaRPr lang="en-US" dirty="0"/>
           </a:p>
         </p:txBody>
       </p:sp>

</xml_diff>